<commit_message>
Revisión y edición de mapa conceptual mat 7 tema 4
</commit_message>
<xml_diff>
--- a/fuentes/contenidos/grado07/guion04/MapaConceptual_MA_07_04_CO.pptx
+++ b/fuentes/contenidos/grado07/guion04/MapaConceptual_MA_07_04_CO.pptx
@@ -462,7 +462,7 @@
           <a:p>
             <a:fld id="{5001C876-01F7-4317-94B9-1AE222133113}" type="datetimeFigureOut">
               <a:rPr lang="es-ES" smtClean="0"/>
-              <a:t>23/10/2015</a:t>
+              <a:t>28/10/2015</a:t>
             </a:fld>
             <a:endParaRPr lang="es-ES"/>
           </a:p>
@@ -1084,7 +1084,7 @@
                 <a:latin typeface="Arial" panose="020B0604020202020204" pitchFamily="34" charset="0"/>
                 <a:cs typeface="Arial" panose="020B0604020202020204" pitchFamily="34" charset="0"/>
               </a:rPr>
-              <a:t>La ecuación</a:t>
+              <a:t>Las ecuaciones con números enteros</a:t>
             </a:r>
             <a:endParaRPr lang="es-ES" sz="1600" dirty="0">
               <a:latin typeface="Arial" panose="020B0604020202020204" pitchFamily="34" charset="0"/>
@@ -1101,8 +1101,8 @@
         </p:nvSpPr>
         <p:spPr>
           <a:xfrm>
-            <a:off x="816655" y="972457"/>
-            <a:ext cx="1124746" cy="439782"/>
+            <a:off x="705968" y="1157361"/>
+            <a:ext cx="1343804" cy="1117098"/>
           </a:xfrm>
           <a:prstGeom prst="rect">
             <a:avLst/>
@@ -1147,7 +1147,14 @@
                 <a:latin typeface="Arial" panose="020B0604020202020204" pitchFamily="34" charset="0"/>
                 <a:cs typeface="Arial" panose="020B0604020202020204" pitchFamily="34" charset="0"/>
               </a:rPr>
-              <a:t>igualdad</a:t>
+              <a:t>I</a:t>
+            </a:r>
+            <a:r>
+              <a:rPr lang="es-ES" sz="1200" b="1" dirty="0" smtClean="0">
+                <a:latin typeface="Arial" panose="020B0604020202020204" pitchFamily="34" charset="0"/>
+                <a:cs typeface="Arial" panose="020B0604020202020204" pitchFamily="34" charset="0"/>
+              </a:rPr>
+              <a:t>gualdades en las cuales hay una cantidad desconocida, identificada como incógnita</a:t>
             </a:r>
             <a:endParaRPr lang="es-ES" sz="1200" b="1" dirty="0">
               <a:latin typeface="Arial" panose="020B0604020202020204" pitchFamily="34" charset="0"/>
@@ -1195,7 +1202,7 @@
         </p:nvSpPr>
         <p:spPr>
           <a:xfrm>
-            <a:off x="816655" y="1548064"/>
+            <a:off x="787986" y="2403410"/>
             <a:ext cx="1122431" cy="230832"/>
           </a:xfrm>
           <a:prstGeom prst="rect">
@@ -1215,7 +1222,7 @@
                 <a:latin typeface="Arial" panose="020B0604020202020204" pitchFamily="34" charset="0"/>
                 <a:cs typeface="Arial" panose="020B0604020202020204" pitchFamily="34" charset="0"/>
               </a:rPr>
-              <a:t>con</a:t>
+              <a:t>se representan</a:t>
             </a:r>
             <a:endParaRPr lang="es-ES" sz="900" dirty="0">
               <a:latin typeface="Arial" panose="020B0604020202020204" pitchFamily="34" charset="0"/>
@@ -1232,8 +1239,8 @@
         </p:nvSpPr>
         <p:spPr>
           <a:xfrm>
-            <a:off x="740789" y="1893829"/>
-            <a:ext cx="1274160" cy="1010065"/>
+            <a:off x="716564" y="2809806"/>
+            <a:ext cx="1322612" cy="1010065"/>
           </a:xfrm>
           <a:prstGeom prst="rect">
             <a:avLst/>
@@ -1268,16 +1275,6 @@
           <a:lstStyle/>
           <a:p>
             <a:r>
-              <a:rPr lang="es-ES" sz="1050" dirty="0">
-                <a:solidFill>
-                  <a:schemeClr val="bg1"/>
-                </a:solidFill>
-                <a:latin typeface="Arial" panose="020B0604020202020204" pitchFamily="34" charset="0"/>
-                <a:cs typeface="Arial" panose="020B0604020202020204" pitchFamily="34" charset="0"/>
-              </a:rPr>
-              <a:t>c</a:t>
-            </a:r>
-            <a:r>
               <a:rPr lang="es-ES" sz="1050" dirty="0" smtClean="0">
                 <a:solidFill>
                   <a:schemeClr val="bg1"/>
@@ -1285,7 +1282,57 @@
                 <a:latin typeface="Arial" panose="020B0604020202020204" pitchFamily="34" charset="0"/>
                 <a:cs typeface="Arial" panose="020B0604020202020204" pitchFamily="34" charset="0"/>
               </a:rPr>
-              <a:t>antidades desconocidas llamadas incógnitas, que la hacen verdadera.</a:t>
+              <a:t>con expresiones donde la incógnita es de primer grado y se indican con letras como </a:t>
+            </a:r>
+            <a:r>
+              <a:rPr lang="es-ES" sz="1050" i="1" dirty="0" smtClean="0">
+                <a:solidFill>
+                  <a:schemeClr val="bg1"/>
+                </a:solidFill>
+                <a:latin typeface="Arial" panose="020B0604020202020204" pitchFamily="34" charset="0"/>
+                <a:cs typeface="Arial" panose="020B0604020202020204" pitchFamily="34" charset="0"/>
+              </a:rPr>
+              <a:t>x</a:t>
+            </a:r>
+            <a:r>
+              <a:rPr lang="es-ES" sz="1050" dirty="0" smtClean="0">
+                <a:solidFill>
+                  <a:schemeClr val="bg1"/>
+                </a:solidFill>
+                <a:latin typeface="Arial" panose="020B0604020202020204" pitchFamily="34" charset="0"/>
+                <a:cs typeface="Arial" panose="020B0604020202020204" pitchFamily="34" charset="0"/>
+              </a:rPr>
+              <a:t>, </a:t>
+            </a:r>
+            <a:r>
+              <a:rPr lang="es-ES" sz="1050" i="1" dirty="0" smtClean="0">
+                <a:solidFill>
+                  <a:schemeClr val="bg1"/>
+                </a:solidFill>
+                <a:latin typeface="Arial" panose="020B0604020202020204" pitchFamily="34" charset="0"/>
+                <a:cs typeface="Arial" panose="020B0604020202020204" pitchFamily="34" charset="0"/>
+              </a:rPr>
+              <a:t>y,</a:t>
+            </a:r>
+            <a:r>
+              <a:rPr lang="es-ES" sz="1050" dirty="0" smtClean="0">
+                <a:solidFill>
+                  <a:schemeClr val="bg1"/>
+                </a:solidFill>
+                <a:latin typeface="Arial" panose="020B0604020202020204" pitchFamily="34" charset="0"/>
+                <a:cs typeface="Arial" panose="020B0604020202020204" pitchFamily="34" charset="0"/>
+              </a:rPr>
+              <a:t> </a:t>
+            </a:r>
+            <a:r>
+              <a:rPr lang="es-ES" sz="1050" i="1" dirty="0" smtClean="0">
+                <a:solidFill>
+                  <a:schemeClr val="bg1"/>
+                </a:solidFill>
+                <a:latin typeface="Arial" panose="020B0604020202020204" pitchFamily="34" charset="0"/>
+                <a:cs typeface="Arial" panose="020B0604020202020204" pitchFamily="34" charset="0"/>
+              </a:rPr>
+              <a:t>z</a:t>
             </a:r>
             <a:endParaRPr lang="es-ES" sz="1050" dirty="0">
               <a:solidFill>
@@ -1325,7 +1372,7 @@
                 <a:latin typeface="Arial" panose="020B0604020202020204" pitchFamily="34" charset="0"/>
                 <a:cs typeface="Arial" panose="020B0604020202020204" pitchFamily="34" charset="0"/>
               </a:rPr>
-              <a:t>es una</a:t>
+              <a:t>son</a:t>
             </a:r>
             <a:endParaRPr lang="es-ES" sz="900" dirty="0">
               <a:latin typeface="Arial" panose="020B0604020202020204" pitchFamily="34" charset="0"/>
@@ -1344,9 +1391,9 @@
           <p:nvPr/>
         </p:nvCxnSpPr>
         <p:spPr>
-          <a:xfrm rot="16200000" flipH="1">
-            <a:off x="1345582" y="939011"/>
-            <a:ext cx="65734" cy="1157"/>
+          <a:xfrm rot="5400000">
+            <a:off x="1252552" y="1032042"/>
+            <a:ext cx="250638" cy="1"/>
           </a:xfrm>
           <a:prstGeom prst="bentConnector3">
             <a:avLst>
@@ -1378,7 +1425,7 @@
         </p:nvSpPr>
         <p:spPr>
           <a:xfrm>
-            <a:off x="3794712" y="991199"/>
+            <a:off x="3794712" y="1156901"/>
             <a:ext cx="1913763" cy="439200"/>
           </a:xfrm>
           <a:prstGeom prst="rect">
@@ -1476,8 +1523,8 @@
         </p:nvSpPr>
         <p:spPr>
           <a:xfrm>
-            <a:off x="4190380" y="1578361"/>
-            <a:ext cx="1122431" cy="230832"/>
+            <a:off x="4101586" y="2043627"/>
+            <a:ext cx="1300013" cy="230832"/>
           </a:xfrm>
           <a:prstGeom prst="rect">
             <a:avLst/>
@@ -1496,7 +1543,14 @@
                 <a:latin typeface="Arial" panose="020B0604020202020204" pitchFamily="34" charset="0"/>
                 <a:cs typeface="Arial" panose="020B0604020202020204" pitchFamily="34" charset="0"/>
               </a:rPr>
-              <a:t>que dice</a:t>
+              <a:t>que </a:t>
+            </a:r>
+            <a:r>
+              <a:rPr lang="es-ES" sz="900" dirty="0" smtClean="0">
+                <a:latin typeface="Arial" panose="020B0604020202020204" pitchFamily="34" charset="0"/>
+                <a:cs typeface="Arial" panose="020B0604020202020204" pitchFamily="34" charset="0"/>
+              </a:rPr>
+              <a:t>se enuncia como</a:t>
             </a:r>
             <a:endParaRPr lang="es-ES" sz="900" dirty="0">
               <a:latin typeface="Arial" panose="020B0604020202020204" pitchFamily="34" charset="0"/>
@@ -1515,9 +1569,9 @@
           <p:nvPr/>
         </p:nvCxnSpPr>
         <p:spPr>
-          <a:xfrm rot="16200000" flipH="1">
-            <a:off x="4677614" y="1504379"/>
-            <a:ext cx="147962" cy="2"/>
+          <a:xfrm rot="5400000">
+            <a:off x="4527831" y="1819864"/>
+            <a:ext cx="447526" cy="1"/>
           </a:xfrm>
           <a:prstGeom prst="bentConnector3">
             <a:avLst>
@@ -1549,8 +1603,8 @@
         </p:nvSpPr>
         <p:spPr>
           <a:xfrm>
-            <a:off x="3896327" y="1947554"/>
-            <a:ext cx="1710535" cy="1218209"/>
+            <a:off x="4233813" y="2809806"/>
+            <a:ext cx="1218792" cy="1218209"/>
           </a:xfrm>
           <a:prstGeom prst="rect">
             <a:avLst/>
@@ -1592,7 +1646,7 @@
                 <a:latin typeface="Arial" panose="020B0604020202020204" pitchFamily="34" charset="0"/>
                 <a:cs typeface="Arial" panose="020B0604020202020204" pitchFamily="34" charset="0"/>
               </a:rPr>
-              <a:t>Si </a:t>
+              <a:t>si </a:t>
             </a:r>
             <a:r>
               <a:rPr lang="es-ES" sz="1050" i="1" dirty="0" smtClean="0">
@@ -2080,43 +2134,6 @@
           </a:p>
         </p:txBody>
       </p:sp>
-      <p:cxnSp>
-        <p:nvCxnSpPr>
-          <p:cNvPr id="260" name="Conector angular 259"/>
-          <p:cNvCxnSpPr/>
-          <p:nvPr/>
-        </p:nvCxnSpPr>
-        <p:spPr>
-          <a:xfrm rot="16200000" flipH="1">
-            <a:off x="3415350" y="2688086"/>
-            <a:ext cx="143029" cy="877"/>
-          </a:xfrm>
-          <a:prstGeom prst="bentConnector3">
-            <a:avLst>
-              <a:gd name="adj1" fmla="val 50000"/>
-            </a:avLst>
-          </a:prstGeom>
-          <a:ln w="12700">
-            <a:solidFill>
-              <a:schemeClr val="tx1"/>
-            </a:solidFill>
-          </a:ln>
-        </p:spPr>
-        <p:style>
-          <a:lnRef idx="1">
-            <a:schemeClr val="accent1"/>
-          </a:lnRef>
-          <a:fillRef idx="0">
-            <a:schemeClr val="accent1"/>
-          </a:fillRef>
-          <a:effectRef idx="0">
-            <a:schemeClr val="accent1"/>
-          </a:effectRef>
-          <a:fontRef idx="minor">
-            <a:schemeClr val="tx1"/>
-          </a:fontRef>
-        </p:style>
-      </p:cxnSp>
       <p:sp>
         <p:nvSpPr>
           <p:cNvPr id="274" name="CuadroTexto 273" descr="Conector entre nodos" title="conector"/>
@@ -2145,7 +2162,7 @@
                 <a:latin typeface="Arial" panose="020B0604020202020204" pitchFamily="34" charset="0"/>
                 <a:cs typeface="Arial" panose="020B0604020202020204" pitchFamily="34" charset="0"/>
               </a:rPr>
-              <a:t>cumple</a:t>
+              <a:t>cumplen</a:t>
             </a:r>
             <a:endParaRPr lang="es-ES" sz="900" dirty="0">
               <a:latin typeface="Arial" panose="020B0604020202020204" pitchFamily="34" charset="0"/>
@@ -2162,8 +2179,8 @@
         </p:nvSpPr>
         <p:spPr>
           <a:xfrm>
-            <a:off x="5953886" y="986452"/>
-            <a:ext cx="1124746" cy="439782"/>
+            <a:off x="5902037" y="1174034"/>
+            <a:ext cx="1283519" cy="619432"/>
           </a:xfrm>
           <a:prstGeom prst="rect">
             <a:avLst/>
@@ -2208,7 +2225,7 @@
                 <a:latin typeface="Arial" panose="020B0604020202020204" pitchFamily="34" charset="0"/>
                 <a:cs typeface="Arial" panose="020B0604020202020204" pitchFamily="34" charset="0"/>
               </a:rPr>
-              <a:t>Solución</a:t>
+              <a:t>Utilizando la transposición de términos</a:t>
             </a:r>
             <a:endParaRPr lang="es-ES" sz="1200" b="1" dirty="0">
               <a:latin typeface="Arial" panose="020B0604020202020204" pitchFamily="34" charset="0"/>
@@ -2225,7 +2242,7 @@
         </p:nvSpPr>
         <p:spPr>
           <a:xfrm>
-            <a:off x="5953886" y="1553230"/>
+            <a:off x="5897375" y="2020670"/>
             <a:ext cx="1122431" cy="230832"/>
           </a:xfrm>
           <a:prstGeom prst="rect">
@@ -2241,18 +2258,11 @@
           <a:p>
             <a:pPr algn="ctr"/>
             <a:r>
-              <a:rPr lang="es-ES" sz="900" dirty="0">
-                <a:latin typeface="Arial" panose="020B0604020202020204" pitchFamily="34" charset="0"/>
-                <a:cs typeface="Arial" panose="020B0604020202020204" pitchFamily="34" charset="0"/>
-              </a:rPr>
-              <a:t>s</a:t>
-            </a:r>
-            <a:r>
               <a:rPr lang="es-ES" sz="900" dirty="0" smtClean="0">
                 <a:latin typeface="Arial" panose="020B0604020202020204" pitchFamily="34" charset="0"/>
                 <a:cs typeface="Arial" panose="020B0604020202020204" pitchFamily="34" charset="0"/>
               </a:rPr>
-              <a:t>egún el</a:t>
+              <a:t>que consiste en</a:t>
             </a:r>
             <a:endParaRPr lang="es-ES" sz="900" dirty="0">
               <a:latin typeface="Arial" panose="020B0604020202020204" pitchFamily="34" charset="0"/>
@@ -2261,42 +2271,6 @@
           </a:p>
         </p:txBody>
       </p:sp>
-      <p:cxnSp>
-        <p:nvCxnSpPr>
-          <p:cNvPr id="338" name="Conector angular 337"/>
-          <p:cNvCxnSpPr>
-            <a:stCxn id="335" idx="2"/>
-            <a:endCxn id="337" idx="0"/>
-          </p:cNvCxnSpPr>
-          <p:nvPr/>
-        </p:nvCxnSpPr>
-        <p:spPr>
-          <a:xfrm rot="5400000">
-            <a:off x="6452183" y="1489154"/>
-            <a:ext cx="126996" cy="1157"/>
-          </a:xfrm>
-          <a:prstGeom prst="bentConnector3">
-            <a:avLst>
-              <a:gd name="adj1" fmla="val 50000"/>
-            </a:avLst>
-          </a:prstGeom>
-          <a:ln/>
-        </p:spPr>
-        <p:style>
-          <a:lnRef idx="3">
-            <a:schemeClr val="dk1"/>
-          </a:lnRef>
-          <a:fillRef idx="0">
-            <a:schemeClr val="dk1"/>
-          </a:fillRef>
-          <a:effectRef idx="2">
-            <a:schemeClr val="dk1"/>
-          </a:effectRef>
-          <a:fontRef idx="minor">
-            <a:schemeClr val="tx1"/>
-          </a:fontRef>
-        </p:style>
-      </p:cxnSp>
       <p:sp>
         <p:nvSpPr>
           <p:cNvPr id="339" name="Rectángulo 338" descr="Nodo de segundo nivel" title="Nodo02"/>
@@ -2305,8 +2279,8 @@
         </p:nvSpPr>
         <p:spPr>
           <a:xfrm>
-            <a:off x="5953886" y="1899157"/>
-            <a:ext cx="1127093" cy="357473"/>
+            <a:off x="6022507" y="2789495"/>
+            <a:ext cx="997299" cy="749271"/>
           </a:xfrm>
           <a:prstGeom prst="rect">
             <a:avLst/>
@@ -2342,16 +2316,6 @@
           <a:p>
             <a:pPr algn="ctr"/>
             <a:r>
-              <a:rPr lang="es-ES" sz="1050" dirty="0">
-                <a:solidFill>
-                  <a:schemeClr val="bg1"/>
-                </a:solidFill>
-                <a:latin typeface="Arial" panose="020B0604020202020204" pitchFamily="34" charset="0"/>
-                <a:cs typeface="Arial" panose="020B0604020202020204" pitchFamily="34" charset="0"/>
-              </a:rPr>
-              <a:t>t</a:t>
-            </a:r>
-            <a:r>
               <a:rPr lang="es-ES" sz="1050" dirty="0" smtClean="0">
                 <a:solidFill>
                   <a:schemeClr val="bg1"/>
@@ -2359,7 +2323,7 @@
                 <a:latin typeface="Arial" panose="020B0604020202020204" pitchFamily="34" charset="0"/>
                 <a:cs typeface="Arial" panose="020B0604020202020204" pitchFamily="34" charset="0"/>
               </a:rPr>
-              <a:t>ipo de ecuación</a:t>
+              <a:t>utilizar las operaciones inversas</a:t>
             </a:r>
             <a:endParaRPr lang="es-ES" sz="1050" dirty="0">
               <a:solidFill>
@@ -2371,42 +2335,6 @@
           </a:p>
         </p:txBody>
       </p:sp>
-      <p:cxnSp>
-        <p:nvCxnSpPr>
-          <p:cNvPr id="340" name="Conector angular 339"/>
-          <p:cNvCxnSpPr>
-            <a:stCxn id="337" idx="2"/>
-            <a:endCxn id="339" idx="0"/>
-          </p:cNvCxnSpPr>
-          <p:nvPr/>
-        </p:nvCxnSpPr>
-        <p:spPr>
-          <a:xfrm rot="16200000" flipH="1">
-            <a:off x="6458720" y="1840443"/>
-            <a:ext cx="115095" cy="2331"/>
-          </a:xfrm>
-          <a:prstGeom prst="bentConnector3">
-            <a:avLst>
-              <a:gd name="adj1" fmla="val 50000"/>
-            </a:avLst>
-          </a:prstGeom>
-          <a:ln/>
-        </p:spPr>
-        <p:style>
-          <a:lnRef idx="3">
-            <a:schemeClr val="dk1"/>
-          </a:lnRef>
-          <a:fillRef idx="0">
-            <a:schemeClr val="dk1"/>
-          </a:fillRef>
-          <a:effectRef idx="2">
-            <a:schemeClr val="dk1"/>
-          </a:effectRef>
-          <a:fontRef idx="minor">
-            <a:schemeClr val="tx1"/>
-          </a:fontRef>
-        </p:style>
-      </p:cxnSp>
       <p:sp>
         <p:nvSpPr>
           <p:cNvPr id="341" name="CuadroTexto 340" descr="Conector entre nodos" title="conector"/>
@@ -2415,8 +2343,8 @@
         </p:nvSpPr>
         <p:spPr>
           <a:xfrm>
-            <a:off x="5959143" y="2386174"/>
-            <a:ext cx="1117174" cy="230836"/>
+            <a:off x="5742404" y="3878776"/>
+            <a:ext cx="1326619" cy="215444"/>
           </a:xfrm>
           <a:prstGeom prst="rect">
             <a:avLst/>
@@ -2431,55 +2359,19 @@
           <a:p>
             <a:pPr algn="ctr"/>
             <a:r>
-              <a:rPr lang="es-ES" sz="900" dirty="0" smtClean="0">
-                <a:latin typeface="Arial" panose="020B0604020202020204" pitchFamily="34" charset="0"/>
-                <a:cs typeface="Arial" panose="020B0604020202020204" pitchFamily="34" charset="0"/>
-              </a:rPr>
-              <a:t>que son</a:t>
-            </a:r>
-            <a:endParaRPr lang="es-ES" sz="900" dirty="0">
+              <a:rPr lang="es-ES" sz="800" dirty="0" smtClean="0">
+                <a:latin typeface="Arial" panose="020B0604020202020204" pitchFamily="34" charset="0"/>
+                <a:cs typeface="Arial" panose="020B0604020202020204" pitchFamily="34" charset="0"/>
+              </a:rPr>
+              <a:t>de la siguiente manera</a:t>
+            </a:r>
+            <a:endParaRPr lang="es-ES" sz="800" dirty="0">
               <a:latin typeface="Arial" panose="020B0604020202020204" pitchFamily="34" charset="0"/>
               <a:cs typeface="Arial" panose="020B0604020202020204" pitchFamily="34" charset="0"/>
             </a:endParaRPr>
           </a:p>
         </p:txBody>
       </p:sp>
-      <p:cxnSp>
-        <p:nvCxnSpPr>
-          <p:cNvPr id="342" name="Conector angular 341"/>
-          <p:cNvCxnSpPr>
-            <a:stCxn id="339" idx="2"/>
-            <a:endCxn id="341" idx="0"/>
-          </p:cNvCxnSpPr>
-          <p:nvPr/>
-        </p:nvCxnSpPr>
-        <p:spPr>
-          <a:xfrm rot="16200000" flipH="1">
-            <a:off x="6452809" y="2321253"/>
-            <a:ext cx="129544" cy="297"/>
-          </a:xfrm>
-          <a:prstGeom prst="bentConnector3">
-            <a:avLst>
-              <a:gd name="adj1" fmla="val 50000"/>
-            </a:avLst>
-          </a:prstGeom>
-          <a:ln/>
-        </p:spPr>
-        <p:style>
-          <a:lnRef idx="3">
-            <a:schemeClr val="dk1"/>
-          </a:lnRef>
-          <a:fillRef idx="0">
-            <a:schemeClr val="dk1"/>
-          </a:fillRef>
-          <a:effectRef idx="2">
-            <a:schemeClr val="dk1"/>
-          </a:effectRef>
-          <a:fontRef idx="minor">
-            <a:schemeClr val="tx1"/>
-          </a:fontRef>
-        </p:style>
-      </p:cxnSp>
       <p:sp>
         <p:nvSpPr>
           <p:cNvPr id="343" name="Rectángulo 342" descr="Nodo de tercer nivel" title="Nodo03"/>
@@ -2488,8 +2380,8 @@
         </p:nvSpPr>
         <p:spPr>
           <a:xfrm>
-            <a:off x="5902037" y="2746554"/>
-            <a:ext cx="1226127" cy="1207175"/>
+            <a:off x="3412456" y="4957436"/>
+            <a:ext cx="1470766" cy="1665277"/>
           </a:xfrm>
           <a:prstGeom prst="rect">
             <a:avLst/>
@@ -2540,11 +2432,81 @@
                 <a:latin typeface="Arial" panose="020B0604020202020204" pitchFamily="34" charset="0"/>
                 <a:cs typeface="Arial" panose="020B0604020202020204" pitchFamily="34" charset="0"/>
               </a:rPr>
-              <a:t>De la forma:</a:t>
-            </a:r>
-          </a:p>
-          <a:p>
-            <a:pPr algn="ctr"/>
+              <a:t>Si la ecuación contiene una adición, se transponen los términos utilizando una sustracción y viceversa</a:t>
+            </a:r>
+          </a:p>
+          <a:p>
+            <a:endParaRPr lang="es-ES" sz="900" dirty="0" smtClean="0">
+              <a:solidFill>
+                <a:schemeClr val="tx1"/>
+              </a:solidFill>
+              <a:latin typeface="Arial" panose="020B0604020202020204" pitchFamily="34" charset="0"/>
+              <a:cs typeface="Arial" panose="020B0604020202020204" pitchFamily="34" charset="0"/>
+            </a:endParaRPr>
+          </a:p>
+          <a:p>
+            <a:r>
+              <a:rPr lang="es-ES" sz="900" dirty="0" smtClean="0">
+                <a:solidFill>
+                  <a:schemeClr val="tx1"/>
+                </a:solidFill>
+                <a:latin typeface="Arial" panose="020B0604020202020204" pitchFamily="34" charset="0"/>
+                <a:cs typeface="Arial" panose="020B0604020202020204" pitchFamily="34" charset="0"/>
+              </a:rPr>
+              <a:t>Si </a:t>
+            </a:r>
+            <a:r>
+              <a:rPr lang="es-ES" sz="900" dirty="0">
+                <a:solidFill>
+                  <a:schemeClr val="tx1"/>
+                </a:solidFill>
+                <a:latin typeface="Arial" panose="020B0604020202020204" pitchFamily="34" charset="0"/>
+                <a:cs typeface="Arial" panose="020B0604020202020204" pitchFamily="34" charset="0"/>
+              </a:rPr>
+              <a:t>la ecuación contiene una </a:t>
+            </a:r>
+            <a:r>
+              <a:rPr lang="es-ES" sz="900" dirty="0" smtClean="0">
+                <a:solidFill>
+                  <a:schemeClr val="tx1"/>
+                </a:solidFill>
+                <a:latin typeface="Arial" panose="020B0604020202020204" pitchFamily="34" charset="0"/>
+                <a:cs typeface="Arial" panose="020B0604020202020204" pitchFamily="34" charset="0"/>
+              </a:rPr>
+              <a:t>multiplicación, </a:t>
+            </a:r>
+            <a:r>
+              <a:rPr lang="es-ES" sz="900" dirty="0">
+                <a:solidFill>
+                  <a:schemeClr val="tx1"/>
+                </a:solidFill>
+                <a:latin typeface="Arial" panose="020B0604020202020204" pitchFamily="34" charset="0"/>
+                <a:cs typeface="Arial" panose="020B0604020202020204" pitchFamily="34" charset="0"/>
+              </a:rPr>
+              <a:t>se transponen los términos utilizando una </a:t>
+            </a:r>
+            <a:r>
+              <a:rPr lang="es-ES" sz="900" dirty="0" smtClean="0">
+                <a:solidFill>
+                  <a:schemeClr val="tx1"/>
+                </a:solidFill>
+                <a:latin typeface="Arial" panose="020B0604020202020204" pitchFamily="34" charset="0"/>
+                <a:cs typeface="Arial" panose="020B0604020202020204" pitchFamily="34" charset="0"/>
+              </a:rPr>
+              <a:t>división </a:t>
+            </a:r>
+            <a:r>
+              <a:rPr lang="es-ES" sz="900" dirty="0">
+                <a:solidFill>
+                  <a:schemeClr val="tx1"/>
+                </a:solidFill>
+                <a:latin typeface="Arial" panose="020B0604020202020204" pitchFamily="34" charset="0"/>
+                <a:cs typeface="Arial" panose="020B0604020202020204" pitchFamily="34" charset="0"/>
+              </a:rPr>
+              <a:t>y viceversa</a:t>
+            </a:r>
+          </a:p>
+          <a:p>
             <a:endParaRPr lang="es-ES" sz="900" dirty="0">
               <a:solidFill>
                 <a:schemeClr val="tx1"/>
@@ -2553,286 +2515,8 @@
               <a:cs typeface="Arial" panose="020B0604020202020204" pitchFamily="34" charset="0"/>
             </a:endParaRPr>
           </a:p>
-          <a:p>
-            <a:pPr marL="171450" indent="-171450">
-              <a:buFontTx/>
-              <a:buChar char="-"/>
-            </a:pPr>
-            <a:r>
-              <a:rPr lang="es-ES" sz="900" i="1" dirty="0" smtClean="0">
-                <a:solidFill>
-                  <a:schemeClr val="tx1"/>
-                </a:solidFill>
-                <a:latin typeface="Arial" panose="020B0604020202020204" pitchFamily="34" charset="0"/>
-                <a:cs typeface="Arial" panose="020B0604020202020204" pitchFamily="34" charset="0"/>
-              </a:rPr>
-              <a:t>x</a:t>
-            </a:r>
-            <a:r>
-              <a:rPr lang="es-ES" sz="900" dirty="0" smtClean="0">
-                <a:solidFill>
-                  <a:schemeClr val="tx1"/>
-                </a:solidFill>
-                <a:latin typeface="Arial" panose="020B0604020202020204" pitchFamily="34" charset="0"/>
-                <a:cs typeface="Arial" panose="020B0604020202020204" pitchFamily="34" charset="0"/>
-              </a:rPr>
-              <a:t> ± </a:t>
-            </a:r>
-            <a:r>
-              <a:rPr lang="es-ES" sz="900" i="1" dirty="0" smtClean="0">
-                <a:solidFill>
-                  <a:schemeClr val="tx1"/>
-                </a:solidFill>
-                <a:latin typeface="Arial" panose="020B0604020202020204" pitchFamily="34" charset="0"/>
-                <a:cs typeface="Arial" panose="020B0604020202020204" pitchFamily="34" charset="0"/>
-              </a:rPr>
-              <a:t>b</a:t>
-            </a:r>
-            <a:r>
-              <a:rPr lang="es-ES" sz="900" dirty="0" smtClean="0">
-                <a:solidFill>
-                  <a:schemeClr val="tx1"/>
-                </a:solidFill>
-                <a:latin typeface="Arial" panose="020B0604020202020204" pitchFamily="34" charset="0"/>
-                <a:cs typeface="Arial" panose="020B0604020202020204" pitchFamily="34" charset="0"/>
-              </a:rPr>
-              <a:t> = </a:t>
-            </a:r>
-            <a:r>
-              <a:rPr lang="es-ES" sz="900" i="1" dirty="0" smtClean="0">
-                <a:solidFill>
-                  <a:schemeClr val="tx1"/>
-                </a:solidFill>
-                <a:latin typeface="Arial" panose="020B0604020202020204" pitchFamily="34" charset="0"/>
-                <a:cs typeface="Arial" panose="020B0604020202020204" pitchFamily="34" charset="0"/>
-              </a:rPr>
-              <a:t>c</a:t>
-            </a:r>
-            <a:r>
-              <a:rPr lang="es-ES" sz="900" dirty="0" smtClean="0">
-                <a:solidFill>
-                  <a:schemeClr val="tx1"/>
-                </a:solidFill>
-                <a:latin typeface="Arial" panose="020B0604020202020204" pitchFamily="34" charset="0"/>
-                <a:cs typeface="Arial" panose="020B0604020202020204" pitchFamily="34" charset="0"/>
-              </a:rPr>
-              <a:t> </a:t>
-            </a:r>
-          </a:p>
-          <a:p>
-            <a:pPr marL="171450" indent="-171450">
-              <a:buFontTx/>
-              <a:buChar char="-"/>
-            </a:pPr>
-            <a:r>
-              <a:rPr lang="es-ES" sz="900" i="1" dirty="0" err="1">
-                <a:solidFill>
-                  <a:schemeClr val="tx1"/>
-                </a:solidFill>
-                <a:latin typeface="Arial" panose="020B0604020202020204" pitchFamily="34" charset="0"/>
-                <a:cs typeface="Arial" panose="020B0604020202020204" pitchFamily="34" charset="0"/>
-              </a:rPr>
-              <a:t>a</a:t>
-            </a:r>
-            <a:r>
-              <a:rPr lang="es-ES" sz="900" i="1" dirty="0" err="1" smtClean="0">
-                <a:solidFill>
-                  <a:schemeClr val="tx1"/>
-                </a:solidFill>
-                <a:latin typeface="Arial" panose="020B0604020202020204" pitchFamily="34" charset="0"/>
-                <a:cs typeface="Arial" panose="020B0604020202020204" pitchFamily="34" charset="0"/>
-              </a:rPr>
-              <a:t>x</a:t>
-            </a:r>
-            <a:r>
-              <a:rPr lang="es-ES" sz="900" dirty="0" smtClean="0">
-                <a:solidFill>
-                  <a:schemeClr val="tx1"/>
-                </a:solidFill>
-                <a:latin typeface="Arial" panose="020B0604020202020204" pitchFamily="34" charset="0"/>
-                <a:cs typeface="Arial" panose="020B0604020202020204" pitchFamily="34" charset="0"/>
-              </a:rPr>
-              <a:t> = </a:t>
-            </a:r>
-            <a:r>
-              <a:rPr lang="es-ES" sz="900" i="1" dirty="0" smtClean="0">
-                <a:solidFill>
-                  <a:schemeClr val="tx1"/>
-                </a:solidFill>
-                <a:latin typeface="Arial" panose="020B0604020202020204" pitchFamily="34" charset="0"/>
-                <a:cs typeface="Arial" panose="020B0604020202020204" pitchFamily="34" charset="0"/>
-              </a:rPr>
-              <a:t>c</a:t>
-            </a:r>
-          </a:p>
-          <a:p>
-            <a:pPr marL="171450" indent="-171450">
-              <a:buFontTx/>
-              <a:buChar char="-"/>
-            </a:pPr>
-            <a:r>
-              <a:rPr lang="es-ES" sz="900" i="1" dirty="0" err="1">
-                <a:solidFill>
-                  <a:schemeClr val="tx1"/>
-                </a:solidFill>
-                <a:latin typeface="Arial" panose="020B0604020202020204" pitchFamily="34" charset="0"/>
-                <a:cs typeface="Arial" panose="020B0604020202020204" pitchFamily="34" charset="0"/>
-              </a:rPr>
-              <a:t>a</a:t>
-            </a:r>
-            <a:r>
-              <a:rPr lang="es-ES" sz="900" i="1" dirty="0" err="1" smtClean="0">
-                <a:solidFill>
-                  <a:schemeClr val="tx1"/>
-                </a:solidFill>
-                <a:latin typeface="Arial" panose="020B0604020202020204" pitchFamily="34" charset="0"/>
-                <a:cs typeface="Arial" panose="020B0604020202020204" pitchFamily="34" charset="0"/>
-              </a:rPr>
-              <a:t>x</a:t>
-            </a:r>
-            <a:r>
-              <a:rPr lang="es-ES" sz="900" dirty="0" smtClean="0">
-                <a:solidFill>
-                  <a:schemeClr val="tx1"/>
-                </a:solidFill>
-                <a:latin typeface="Arial" panose="020B0604020202020204" pitchFamily="34" charset="0"/>
-                <a:cs typeface="Arial" panose="020B0604020202020204" pitchFamily="34" charset="0"/>
-              </a:rPr>
-              <a:t> ± </a:t>
-            </a:r>
-            <a:r>
-              <a:rPr lang="es-ES" sz="900" i="1" dirty="0" smtClean="0">
-                <a:solidFill>
-                  <a:schemeClr val="tx1"/>
-                </a:solidFill>
-                <a:latin typeface="Arial" panose="020B0604020202020204" pitchFamily="34" charset="0"/>
-                <a:cs typeface="Arial" panose="020B0604020202020204" pitchFamily="34" charset="0"/>
-              </a:rPr>
-              <a:t>b</a:t>
-            </a:r>
-            <a:r>
-              <a:rPr lang="es-ES" sz="900" dirty="0" smtClean="0">
-                <a:solidFill>
-                  <a:schemeClr val="tx1"/>
-                </a:solidFill>
-                <a:latin typeface="Arial" panose="020B0604020202020204" pitchFamily="34" charset="0"/>
-                <a:cs typeface="Arial" panose="020B0604020202020204" pitchFamily="34" charset="0"/>
-              </a:rPr>
-              <a:t> = </a:t>
-            </a:r>
-            <a:r>
-              <a:rPr lang="es-ES" sz="900" i="1" dirty="0" smtClean="0">
-                <a:solidFill>
-                  <a:schemeClr val="tx1"/>
-                </a:solidFill>
-                <a:latin typeface="Arial" panose="020B0604020202020204" pitchFamily="34" charset="0"/>
-                <a:cs typeface="Arial" panose="020B0604020202020204" pitchFamily="34" charset="0"/>
-              </a:rPr>
-              <a:t>c</a:t>
-            </a:r>
-          </a:p>
-          <a:p>
-            <a:pPr marL="171450" indent="-171450">
-              <a:buFontTx/>
-              <a:buChar char="-"/>
-            </a:pPr>
-            <a:endParaRPr lang="es-ES" sz="900" dirty="0">
-              <a:solidFill>
-                <a:schemeClr val="tx1"/>
-              </a:solidFill>
-              <a:latin typeface="Arial" panose="020B0604020202020204" pitchFamily="34" charset="0"/>
-              <a:cs typeface="Arial" panose="020B0604020202020204" pitchFamily="34" charset="0"/>
-            </a:endParaRPr>
-          </a:p>
-          <a:p>
-            <a:r>
-              <a:rPr lang="es-ES_tradnl" sz="900" dirty="0"/>
-              <a:t>con </a:t>
-            </a:r>
-            <a:r>
-              <a:rPr lang="es-ES_tradnl" sz="900" i="1" dirty="0"/>
-              <a:t>a</a:t>
-            </a:r>
-            <a:r>
-              <a:rPr lang="es-ES_tradnl" sz="900" dirty="0"/>
-              <a:t>, </a:t>
-            </a:r>
-            <a:r>
-              <a:rPr lang="es-ES_tradnl" sz="900" i="1" dirty="0"/>
-              <a:t>b</a:t>
-            </a:r>
-            <a:r>
-              <a:rPr lang="es-ES_tradnl" sz="900" dirty="0"/>
-              <a:t> y </a:t>
-            </a:r>
-            <a:r>
-              <a:rPr lang="es-ES_tradnl" sz="900" i="1" dirty="0"/>
-              <a:t>c</a:t>
-            </a:r>
-            <a:r>
-              <a:rPr lang="es-ES_tradnl" sz="900" dirty="0"/>
-              <a:t> números enteros y </a:t>
-            </a:r>
-            <a:r>
-              <a:rPr lang="es-ES_tradnl" sz="900" i="1" dirty="0"/>
-              <a:t>a</a:t>
-            </a:r>
-            <a:r>
-              <a:rPr lang="es-ES_tradnl" sz="900" dirty="0"/>
-              <a:t> ≠ 0</a:t>
-            </a:r>
-            <a:r>
-              <a:rPr lang="es-ES_tradnl" sz="900" dirty="0" smtClean="0"/>
-              <a:t>.</a:t>
-            </a:r>
-          </a:p>
-          <a:p>
-            <a:endParaRPr lang="es-ES" sz="900" dirty="0">
-              <a:solidFill>
-                <a:schemeClr val="tx1"/>
-              </a:solidFill>
-              <a:latin typeface="Arial" panose="020B0604020202020204" pitchFamily="34" charset="0"/>
-              <a:cs typeface="Arial" panose="020B0604020202020204" pitchFamily="34" charset="0"/>
-            </a:endParaRPr>
-          </a:p>
         </p:txBody>
       </p:sp>
-      <p:cxnSp>
-        <p:nvCxnSpPr>
-          <p:cNvPr id="347" name="Conector angular 346"/>
-          <p:cNvCxnSpPr>
-            <a:stCxn id="341" idx="2"/>
-            <a:endCxn id="343" idx="0"/>
-          </p:cNvCxnSpPr>
-          <p:nvPr/>
-        </p:nvCxnSpPr>
-        <p:spPr>
-          <a:xfrm rot="5400000">
-            <a:off x="6451644" y="2680468"/>
-            <a:ext cx="129544" cy="2629"/>
-          </a:xfrm>
-          <a:prstGeom prst="bentConnector3">
-            <a:avLst>
-              <a:gd name="adj1" fmla="val 50000"/>
-            </a:avLst>
-          </a:prstGeom>
-          <a:ln/>
-        </p:spPr>
-        <p:style>
-          <a:lnRef idx="3">
-            <a:schemeClr val="dk1"/>
-          </a:lnRef>
-          <a:fillRef idx="0">
-            <a:schemeClr val="dk1"/>
-          </a:fillRef>
-          <a:effectRef idx="2">
-            <a:schemeClr val="dk1"/>
-          </a:effectRef>
-          <a:fontRef idx="minor">
-            <a:schemeClr val="tx1"/>
-          </a:fontRef>
-        </p:style>
-      </p:cxnSp>
       <p:sp>
         <p:nvSpPr>
           <p:cNvPr id="361" name="CuadroTexto 360" descr="Conector entre nodos" title="conector"/>
@@ -2861,7 +2545,7 @@
                 <a:latin typeface="Arial" panose="020B0604020202020204" pitchFamily="34" charset="0"/>
                 <a:cs typeface="Arial" panose="020B0604020202020204" pitchFamily="34" charset="0"/>
               </a:rPr>
-              <a:t>tiene</a:t>
+              <a:t>se resuelven</a:t>
             </a:r>
             <a:endParaRPr lang="es-ES" sz="900" dirty="0">
               <a:latin typeface="Arial" panose="020B0604020202020204" pitchFamily="34" charset="0"/>
@@ -2870,41 +2554,6 @@
           </a:p>
         </p:txBody>
       </p:sp>
-      <p:cxnSp>
-        <p:nvCxnSpPr>
-          <p:cNvPr id="362" name="Conector angular 361"/>
-          <p:cNvCxnSpPr>
-            <a:endCxn id="335" idx="0"/>
-          </p:cNvCxnSpPr>
-          <p:nvPr/>
-        </p:nvCxnSpPr>
-        <p:spPr>
-          <a:xfrm rot="16200000" flipH="1">
-            <a:off x="6482813" y="953006"/>
-            <a:ext cx="65734" cy="1157"/>
-          </a:xfrm>
-          <a:prstGeom prst="bentConnector3">
-            <a:avLst>
-              <a:gd name="adj1" fmla="val 50000"/>
-            </a:avLst>
-          </a:prstGeom>
-          <a:ln/>
-        </p:spPr>
-        <p:style>
-          <a:lnRef idx="3">
-            <a:schemeClr val="dk1"/>
-          </a:lnRef>
-          <a:fillRef idx="0">
-            <a:schemeClr val="dk1"/>
-          </a:fillRef>
-          <a:effectRef idx="2">
-            <a:schemeClr val="dk1"/>
-          </a:effectRef>
-          <a:fontRef idx="minor">
-            <a:schemeClr val="tx1"/>
-          </a:fontRef>
-        </p:style>
-      </p:cxnSp>
       <p:sp>
         <p:nvSpPr>
           <p:cNvPr id="113" name="Rectángulo 112" descr="Nodo de primer nivel" title="Nodo01"/>
@@ -2913,7 +2562,7 @@
         </p:nvSpPr>
         <p:spPr>
           <a:xfrm>
-            <a:off x="2434225" y="986452"/>
+            <a:off x="2434610" y="1169400"/>
             <a:ext cx="1124746" cy="439782"/>
           </a:xfrm>
           <a:prstGeom prst="rect">
@@ -2955,18 +2604,11 @@
           <a:p>
             <a:pPr algn="ctr"/>
             <a:r>
-              <a:rPr lang="es-ES" sz="1200" b="1" dirty="0">
-                <a:latin typeface="Arial" panose="020B0604020202020204" pitchFamily="34" charset="0"/>
-                <a:cs typeface="Arial" panose="020B0604020202020204" pitchFamily="34" charset="0"/>
-              </a:rPr>
-              <a:t>e</a:t>
-            </a:r>
-            <a:r>
               <a:rPr lang="es-ES" sz="1200" b="1" dirty="0" smtClean="0">
                 <a:latin typeface="Arial" panose="020B0604020202020204" pitchFamily="34" charset="0"/>
                 <a:cs typeface="Arial" panose="020B0604020202020204" pitchFamily="34" charset="0"/>
               </a:rPr>
-              <a:t>lementos</a:t>
+              <a:t>Elementos</a:t>
             </a:r>
             <a:endParaRPr lang="es-ES" sz="1200" b="1" dirty="0">
               <a:latin typeface="Arial" panose="020B0604020202020204" pitchFamily="34" charset="0"/>
@@ -2983,7 +2625,7 @@
         </p:nvSpPr>
         <p:spPr>
           <a:xfrm>
-            <a:off x="2434225" y="1529082"/>
+            <a:off x="2386948" y="1962477"/>
             <a:ext cx="1122431" cy="230832"/>
           </a:xfrm>
           <a:prstGeom prst="rect">
@@ -3003,7 +2645,7 @@
                 <a:latin typeface="Arial" panose="020B0604020202020204" pitchFamily="34" charset="0"/>
                 <a:cs typeface="Arial" panose="020B0604020202020204" pitchFamily="34" charset="0"/>
               </a:rPr>
-              <a:t>son</a:t>
+              <a:t>como</a:t>
             </a:r>
             <a:endParaRPr lang="es-ES" sz="900" dirty="0">
               <a:latin typeface="Arial" panose="020B0604020202020204" pitchFamily="34" charset="0"/>
@@ -3020,7 +2662,7 @@
         </p:nvSpPr>
         <p:spPr>
           <a:xfrm>
-            <a:off x="2277065" y="1861681"/>
+            <a:off x="2267078" y="2809809"/>
             <a:ext cx="1435660" cy="1243114"/>
           </a:xfrm>
           <a:prstGeom prst="rect">
@@ -3067,69 +2709,7 @@
                 <a:latin typeface="Arial" panose="020B0604020202020204" pitchFamily="34" charset="0"/>
                 <a:cs typeface="Arial" panose="020B0604020202020204" pitchFamily="34" charset="0"/>
               </a:rPr>
-              <a:t>L</a:t>
-            </a:r>
-            <a:r>
-              <a:rPr lang="es-ES" sz="1050" dirty="0" smtClean="0">
-                <a:solidFill>
-                  <a:schemeClr val="bg1"/>
-                </a:solidFill>
-                <a:latin typeface="Arial" panose="020B0604020202020204" pitchFamily="34" charset="0"/>
-                <a:cs typeface="Arial" panose="020B0604020202020204" pitchFamily="34" charset="0"/>
-              </a:rPr>
-              <a:t>os </a:t>
-            </a:r>
-            <a:r>
-              <a:rPr lang="es-ES" sz="1050" dirty="0" smtClean="0">
-                <a:solidFill>
-                  <a:schemeClr val="bg1"/>
-                </a:solidFill>
-                <a:latin typeface="Arial" panose="020B0604020202020204" pitchFamily="34" charset="0"/>
-                <a:cs typeface="Arial" panose="020B0604020202020204" pitchFamily="34" charset="0"/>
-              </a:rPr>
-              <a:t>miembros.</a:t>
-            </a:r>
-          </a:p>
-          <a:p>
-            <a:pPr marL="171450" indent="-171450">
-              <a:buFontTx/>
-              <a:buChar char="-"/>
-            </a:pPr>
-            <a:r>
-              <a:rPr lang="es-ES" sz="1050" dirty="0" smtClean="0">
-                <a:solidFill>
-                  <a:schemeClr val="bg1"/>
-                </a:solidFill>
-                <a:latin typeface="Arial" panose="020B0604020202020204" pitchFamily="34" charset="0"/>
-                <a:cs typeface="Arial" panose="020B0604020202020204" pitchFamily="34" charset="0"/>
-              </a:rPr>
-              <a:t>La incógnita o variable.</a:t>
-            </a:r>
-          </a:p>
-          <a:p>
-            <a:pPr marL="171450" indent="-171450">
-              <a:buFontTx/>
-              <a:buChar char="-"/>
-            </a:pPr>
-            <a:r>
-              <a:rPr lang="es-ES" sz="1050" dirty="0" smtClean="0">
-                <a:solidFill>
-                  <a:schemeClr val="bg1"/>
-                </a:solidFill>
-                <a:latin typeface="Arial" panose="020B0604020202020204" pitchFamily="34" charset="0"/>
-                <a:cs typeface="Arial" panose="020B0604020202020204" pitchFamily="34" charset="0"/>
-              </a:rPr>
-              <a:t>El término </a:t>
-            </a:r>
-            <a:r>
-              <a:rPr lang="es-ES" sz="1050" dirty="0" smtClean="0">
-                <a:solidFill>
-                  <a:schemeClr val="bg1"/>
-                </a:solidFill>
-                <a:latin typeface="Arial" panose="020B0604020202020204" pitchFamily="34" charset="0"/>
-                <a:cs typeface="Arial" panose="020B0604020202020204" pitchFamily="34" charset="0"/>
-              </a:rPr>
-              <a:t>independiente.</a:t>
+              <a:t>los miembros</a:t>
             </a:r>
             <a:endParaRPr lang="es-ES" sz="1050" dirty="0" smtClean="0">
               <a:solidFill>
@@ -3152,8 +2732,15 @@
                 <a:latin typeface="Arial" panose="020B0604020202020204" pitchFamily="34" charset="0"/>
                 <a:cs typeface="Arial" panose="020B0604020202020204" pitchFamily="34" charset="0"/>
               </a:rPr>
-              <a:t>El grado.</a:t>
-            </a:r>
+              <a:t>la incógnita</a:t>
+            </a:r>
+            <a:endParaRPr lang="es-ES" sz="1050" dirty="0" smtClean="0">
+              <a:solidFill>
+                <a:schemeClr val="bg1"/>
+              </a:solidFill>
+              <a:latin typeface="Arial" panose="020B0604020202020204" pitchFamily="34" charset="0"/>
+              <a:cs typeface="Arial" panose="020B0604020202020204" pitchFamily="34" charset="0"/>
+            </a:endParaRPr>
           </a:p>
           <a:p>
             <a:pPr marL="171450" indent="-171450">
@@ -3168,7 +2755,73 @@
                 <a:latin typeface="Arial" panose="020B0604020202020204" pitchFamily="34" charset="0"/>
                 <a:cs typeface="Arial" panose="020B0604020202020204" pitchFamily="34" charset="0"/>
               </a:rPr>
-              <a:t>La solución.</a:t>
+              <a:t>el </a:t>
+            </a:r>
+            <a:r>
+              <a:rPr lang="es-ES" sz="1050" dirty="0" smtClean="0">
+                <a:solidFill>
+                  <a:schemeClr val="bg1"/>
+                </a:solidFill>
+                <a:latin typeface="Arial" panose="020B0604020202020204" pitchFamily="34" charset="0"/>
+                <a:cs typeface="Arial" panose="020B0604020202020204" pitchFamily="34" charset="0"/>
+              </a:rPr>
+              <a:t>término </a:t>
+            </a:r>
+            <a:r>
+              <a:rPr lang="es-ES" sz="1050" dirty="0" smtClean="0">
+                <a:solidFill>
+                  <a:schemeClr val="bg1"/>
+                </a:solidFill>
+                <a:latin typeface="Arial" panose="020B0604020202020204" pitchFamily="34" charset="0"/>
+                <a:cs typeface="Arial" panose="020B0604020202020204" pitchFamily="34" charset="0"/>
+              </a:rPr>
+              <a:t>independiente</a:t>
+            </a:r>
+            <a:endParaRPr lang="es-ES" sz="1050" dirty="0" smtClean="0">
+              <a:solidFill>
+                <a:schemeClr val="bg1"/>
+              </a:solidFill>
+              <a:latin typeface="Arial" panose="020B0604020202020204" pitchFamily="34" charset="0"/>
+              <a:cs typeface="Arial" panose="020B0604020202020204" pitchFamily="34" charset="0"/>
+            </a:endParaRPr>
+          </a:p>
+          <a:p>
+            <a:pPr marL="171450" indent="-171450">
+              <a:buFontTx/>
+              <a:buChar char="-"/>
+            </a:pPr>
+            <a:r>
+              <a:rPr lang="es-ES" sz="1050" dirty="0" smtClean="0">
+                <a:solidFill>
+                  <a:schemeClr val="bg1"/>
+                </a:solidFill>
+                <a:latin typeface="Arial" panose="020B0604020202020204" pitchFamily="34" charset="0"/>
+                <a:cs typeface="Arial" panose="020B0604020202020204" pitchFamily="34" charset="0"/>
+              </a:rPr>
+              <a:t>el grado</a:t>
+            </a:r>
+            <a:endParaRPr lang="es-ES" sz="1050" dirty="0" smtClean="0">
+              <a:solidFill>
+                <a:schemeClr val="bg1"/>
+              </a:solidFill>
+              <a:latin typeface="Arial" panose="020B0604020202020204" pitchFamily="34" charset="0"/>
+              <a:cs typeface="Arial" panose="020B0604020202020204" pitchFamily="34" charset="0"/>
+            </a:endParaRPr>
+          </a:p>
+          <a:p>
+            <a:pPr marL="171450" indent="-171450">
+              <a:buFontTx/>
+              <a:buChar char="-"/>
+            </a:pPr>
+            <a:r>
+              <a:rPr lang="es-ES" sz="1050" dirty="0" smtClean="0">
+                <a:solidFill>
+                  <a:schemeClr val="bg1"/>
+                </a:solidFill>
+                <a:latin typeface="Arial" panose="020B0604020202020204" pitchFamily="34" charset="0"/>
+                <a:cs typeface="Arial" panose="020B0604020202020204" pitchFamily="34" charset="0"/>
+              </a:rPr>
+              <a:t>la solución</a:t>
             </a:r>
             <a:endParaRPr lang="es-ES" sz="1050" dirty="0">
               <a:solidFill>
@@ -3188,7 +2841,7 @@
         </p:nvSpPr>
         <p:spPr>
           <a:xfrm>
-            <a:off x="2434226" y="688350"/>
+            <a:off x="2439241" y="711848"/>
             <a:ext cx="1122431" cy="230832"/>
           </a:xfrm>
           <a:prstGeom prst="rect">
@@ -3219,116 +2872,16 @@
       </p:sp>
       <p:cxnSp>
         <p:nvCxnSpPr>
-          <p:cNvPr id="25" name="Conector angular 24"/>
-          <p:cNvCxnSpPr>
-            <a:stCxn id="5" idx="2"/>
-            <a:endCxn id="19" idx="0"/>
-          </p:cNvCxnSpPr>
-          <p:nvPr/>
-        </p:nvCxnSpPr>
-        <p:spPr>
-          <a:xfrm rot="5400000">
-            <a:off x="1310538" y="1479573"/>
-            <a:ext cx="135825" cy="1157"/>
-          </a:xfrm>
-          <a:prstGeom prst="bentConnector3">
-            <a:avLst/>
-          </a:prstGeom>
-        </p:spPr>
-        <p:style>
-          <a:lnRef idx="3">
-            <a:schemeClr val="dk1"/>
-          </a:lnRef>
-          <a:fillRef idx="0">
-            <a:schemeClr val="dk1"/>
-          </a:fillRef>
-          <a:effectRef idx="2">
-            <a:schemeClr val="dk1"/>
-          </a:effectRef>
-          <a:fontRef idx="minor">
-            <a:schemeClr val="tx1"/>
-          </a:fontRef>
-        </p:style>
-      </p:cxnSp>
-      <p:cxnSp>
-        <p:nvCxnSpPr>
-          <p:cNvPr id="32" name="Conector angular 31"/>
-          <p:cNvCxnSpPr>
-            <a:stCxn id="19" idx="2"/>
-            <a:endCxn id="44" idx="0"/>
-          </p:cNvCxnSpPr>
-          <p:nvPr/>
-        </p:nvCxnSpPr>
-        <p:spPr>
-          <a:xfrm rot="5400000">
-            <a:off x="1320404" y="1836361"/>
-            <a:ext cx="114933" cy="2"/>
-          </a:xfrm>
-          <a:prstGeom prst="bentConnector3">
-            <a:avLst/>
-          </a:prstGeom>
-        </p:spPr>
-        <p:style>
-          <a:lnRef idx="3">
-            <a:schemeClr val="dk1"/>
-          </a:lnRef>
-          <a:fillRef idx="0">
-            <a:schemeClr val="dk1"/>
-          </a:fillRef>
-          <a:effectRef idx="2">
-            <a:schemeClr val="dk1"/>
-          </a:effectRef>
-          <a:fontRef idx="minor">
-            <a:schemeClr val="tx1"/>
-          </a:fontRef>
-        </p:style>
-      </p:cxnSp>
-      <p:cxnSp>
-        <p:nvCxnSpPr>
-          <p:cNvPr id="36" name="Conector angular 35"/>
-          <p:cNvCxnSpPr>
-            <a:stCxn id="113" idx="2"/>
-            <a:endCxn id="114" idx="0"/>
-          </p:cNvCxnSpPr>
-          <p:nvPr/>
-        </p:nvCxnSpPr>
-        <p:spPr>
-          <a:xfrm rot="5400000">
-            <a:off x="2944596" y="1477080"/>
-            <a:ext cx="102848" cy="1157"/>
-          </a:xfrm>
-          <a:prstGeom prst="bentConnector3">
-            <a:avLst/>
-          </a:prstGeom>
-        </p:spPr>
-        <p:style>
-          <a:lnRef idx="3">
-            <a:schemeClr val="dk1"/>
-          </a:lnRef>
-          <a:fillRef idx="0">
-            <a:schemeClr val="dk1"/>
-          </a:fillRef>
-          <a:effectRef idx="2">
-            <a:schemeClr val="dk1"/>
-          </a:effectRef>
-          <a:fontRef idx="minor">
-            <a:schemeClr val="tx1"/>
-          </a:fontRef>
-        </p:style>
-      </p:cxnSp>
-      <p:cxnSp>
-        <p:nvCxnSpPr>
           <p:cNvPr id="38" name="Conector angular 37"/>
           <p:cNvCxnSpPr>
-            <a:stCxn id="114" idx="2"/>
             <a:endCxn id="115" idx="0"/>
           </p:cNvCxnSpPr>
           <p:nvPr/>
         </p:nvCxnSpPr>
         <p:spPr>
-          <a:xfrm rot="5400000">
-            <a:off x="2944285" y="1810524"/>
-            <a:ext cx="101767" cy="546"/>
+          <a:xfrm rot="16200000" flipH="1">
+            <a:off x="2733740" y="2558641"/>
+            <a:ext cx="500310" cy="2026"/>
           </a:xfrm>
           <a:prstGeom prst="bentConnector3">
             <a:avLst/>
@@ -3352,16 +2905,13 @@
       <p:cxnSp>
         <p:nvCxnSpPr>
           <p:cNvPr id="50" name="Conector angular 49"/>
-          <p:cNvCxnSpPr>
-            <a:stCxn id="220" idx="0"/>
-            <a:endCxn id="218" idx="2"/>
-          </p:cNvCxnSpPr>
+          <p:cNvCxnSpPr/>
           <p:nvPr/>
         </p:nvCxnSpPr>
         <p:spPr>
-          <a:xfrm rot="5400000" flipH="1" flipV="1">
-            <a:off x="4682415" y="1878374"/>
-            <a:ext cx="138361" cy="1"/>
+          <a:xfrm rot="16200000" flipV="1">
+            <a:off x="4487879" y="2542132"/>
+            <a:ext cx="535347" cy="1"/>
           </a:xfrm>
           <a:prstGeom prst="bentConnector3">
             <a:avLst/>
@@ -3392,7 +2942,7 @@
         </p:nvCxnSpPr>
         <p:spPr>
           <a:xfrm rot="16200000" flipH="1">
-            <a:off x="2931094" y="624002"/>
+            <a:off x="2936109" y="647500"/>
             <a:ext cx="128148" cy="547"/>
           </a:xfrm>
           <a:prstGeom prst="bentConnector3">
@@ -3424,9 +2974,9 @@
           <p:nvPr/>
         </p:nvCxnSpPr>
         <p:spPr>
-          <a:xfrm rot="16200000" flipH="1">
-            <a:off x="2962385" y="952239"/>
-            <a:ext cx="67270" cy="1156"/>
+          <a:xfrm rot="5400000">
+            <a:off x="2885360" y="1054303"/>
+            <a:ext cx="226720" cy="3474"/>
           </a:xfrm>
           <a:prstGeom prst="bentConnector3">
             <a:avLst/>
@@ -3490,8 +3040,8 @@
         </p:nvCxnSpPr>
         <p:spPr>
           <a:xfrm rot="5400000">
-            <a:off x="4709357" y="948959"/>
-            <a:ext cx="84477" cy="2"/>
+            <a:off x="4626506" y="1031810"/>
+            <a:ext cx="250179" cy="2"/>
           </a:xfrm>
           <a:prstGeom prst="bentConnector3">
             <a:avLst/>
@@ -3583,7 +3133,7 @@
         </p:nvSpPr>
         <p:spPr>
           <a:xfrm>
-            <a:off x="7465785" y="1600494"/>
+            <a:off x="7465785" y="2002007"/>
             <a:ext cx="1122431" cy="230832"/>
           </a:xfrm>
           <a:prstGeom prst="rect">
@@ -3603,7 +3153,7 @@
                 <a:latin typeface="Arial" panose="020B0604020202020204" pitchFamily="34" charset="0"/>
                 <a:cs typeface="Arial" panose="020B0604020202020204" pitchFamily="34" charset="0"/>
               </a:rPr>
-              <a:t>por medio de</a:t>
+              <a:t>con estos pasos</a:t>
             </a:r>
             <a:endParaRPr lang="es-ES" sz="900" dirty="0">
               <a:latin typeface="Arial" panose="020B0604020202020204" pitchFamily="34" charset="0"/>
@@ -3623,8 +3173,8 @@
         </p:nvCxnSpPr>
         <p:spPr>
           <a:xfrm rot="16200000" flipH="1">
-            <a:off x="7968051" y="1541543"/>
-            <a:ext cx="116743" cy="1158"/>
+            <a:off x="7767294" y="1742300"/>
+            <a:ext cx="518256" cy="1158"/>
           </a:xfrm>
           <a:prstGeom prst="bentConnector3">
             <a:avLst>
@@ -3656,8 +3206,8 @@
         </p:nvSpPr>
         <p:spPr>
           <a:xfrm>
-            <a:off x="7309605" y="1963975"/>
-            <a:ext cx="1430159" cy="3565967"/>
+            <a:off x="7391583" y="2786499"/>
+            <a:ext cx="1548148" cy="1991176"/>
           </a:xfrm>
           <a:prstGeom prst="rect">
             <a:avLst/>
@@ -3691,6 +3241,19 @@
           <a:bodyPr rtlCol="0" anchor="ctr"/>
           <a:lstStyle/>
           <a:p>
+            <a:pPr marL="228600" indent="-228600">
+              <a:buAutoNum type="arabicPeriod"/>
+            </a:pPr>
+            <a:r>
+              <a:rPr lang="es-ES" sz="1050" dirty="0">
+                <a:solidFill>
+                  <a:schemeClr val="bg1"/>
+                </a:solidFill>
+                <a:latin typeface="Arial" panose="020B0604020202020204" pitchFamily="34" charset="0"/>
+                <a:cs typeface="Arial" panose="020B0604020202020204" pitchFamily="34" charset="0"/>
+              </a:rPr>
+              <a:t>I</a:t>
+            </a:r>
             <a:r>
               <a:rPr lang="es-ES" sz="1050" dirty="0" smtClean="0">
                 <a:solidFill>
@@ -3699,8 +3262,13 @@
                 <a:latin typeface="Arial" panose="020B0604020202020204" pitchFamily="34" charset="0"/>
                 <a:cs typeface="Arial" panose="020B0604020202020204" pitchFamily="34" charset="0"/>
               </a:rPr>
-              <a:t>Los siguientes </a:t>
-            </a:r>
+              <a:t>dentificar qué representa la incógnita</a:t>
+            </a:r>
+          </a:p>
+          <a:p>
+            <a:pPr marL="228600" indent="-228600">
+              <a:buAutoNum type="arabicPeriod"/>
+            </a:pPr>
             <a:r>
               <a:rPr lang="es-ES" sz="1050" dirty="0" smtClean="0">
                 <a:solidFill>
@@ -3709,11 +3277,9 @@
                 <a:latin typeface="Arial" panose="020B0604020202020204" pitchFamily="34" charset="0"/>
                 <a:cs typeface="Arial" panose="020B0604020202020204" pitchFamily="34" charset="0"/>
               </a:rPr>
-              <a:t>pasos:</a:t>
-            </a:r>
-          </a:p>
-          <a:p>
-            <a:endParaRPr lang="es-ES" sz="1050" dirty="0">
+              <a:t>Relacionar los datos para traducir el enunciado  en una ecuación</a:t>
+            </a:r>
+            <a:endParaRPr lang="es-ES" sz="1050" dirty="0" smtClean="0">
               <a:solidFill>
                 <a:schemeClr val="bg1"/>
               </a:solidFill>
@@ -3733,8 +3299,25 @@
                 <a:latin typeface="Arial" panose="020B0604020202020204" pitchFamily="34" charset="0"/>
                 <a:cs typeface="Arial" panose="020B0604020202020204" pitchFamily="34" charset="0"/>
               </a:rPr>
-              <a:t>Leer y entender el problema.</a:t>
-            </a:r>
+              <a:t>Resolver la </a:t>
+            </a:r>
+            <a:r>
+              <a:rPr lang="es-ES" sz="1050" dirty="0" smtClean="0">
+                <a:solidFill>
+                  <a:schemeClr val="bg1"/>
+                </a:solidFill>
+                <a:latin typeface="Arial" panose="020B0604020202020204" pitchFamily="34" charset="0"/>
+                <a:cs typeface="Arial" panose="020B0604020202020204" pitchFamily="34" charset="0"/>
+              </a:rPr>
+              <a:t>ecuación</a:t>
+            </a:r>
+            <a:endParaRPr lang="es-ES" sz="1050" dirty="0" smtClean="0">
+              <a:solidFill>
+                <a:schemeClr val="bg1"/>
+              </a:solidFill>
+              <a:latin typeface="Arial" panose="020B0604020202020204" pitchFamily="34" charset="0"/>
+              <a:cs typeface="Arial" panose="020B0604020202020204" pitchFamily="34" charset="0"/>
+            </a:endParaRPr>
           </a:p>
           <a:p>
             <a:pPr marL="228600" indent="-228600">
@@ -3748,7 +3331,7 @@
                 <a:latin typeface="Arial" panose="020B0604020202020204" pitchFamily="34" charset="0"/>
                 <a:cs typeface="Arial" panose="020B0604020202020204" pitchFamily="34" charset="0"/>
               </a:rPr>
-              <a:t>Designar variables a los </a:t>
+              <a:t>Verificar </a:t>
             </a:r>
             <a:r>
               <a:rPr lang="es-ES" sz="1050" dirty="0" smtClean="0">
@@ -3758,7 +3341,7 @@
                 <a:latin typeface="Arial" panose="020B0604020202020204" pitchFamily="34" charset="0"/>
                 <a:cs typeface="Arial" panose="020B0604020202020204" pitchFamily="34" charset="0"/>
               </a:rPr>
-              <a:t>datos. </a:t>
+              <a:t>el valor de verdad de la </a:t>
             </a:r>
             <a:r>
               <a:rPr lang="es-ES" sz="1050" dirty="0" smtClean="0">
@@ -3768,122 +3351,18 @@
                 <a:latin typeface="Arial" panose="020B0604020202020204" pitchFamily="34" charset="0"/>
                 <a:cs typeface="Arial" panose="020B0604020202020204" pitchFamily="34" charset="0"/>
               </a:rPr>
-              <a:t>desconocidos.</a:t>
-            </a:r>
-          </a:p>
-          <a:p>
-            <a:pPr marL="228600" indent="-228600">
-              <a:buAutoNum type="arabicPeriod"/>
-            </a:pPr>
-            <a:r>
-              <a:rPr lang="es-ES" sz="1050" dirty="0" smtClean="0">
-                <a:solidFill>
-                  <a:schemeClr val="bg1"/>
-                </a:solidFill>
-                <a:latin typeface="Arial" panose="020B0604020202020204" pitchFamily="34" charset="0"/>
-                <a:cs typeface="Arial" panose="020B0604020202020204" pitchFamily="34" charset="0"/>
-              </a:rPr>
-              <a:t>Identificar la información conocida.</a:t>
-            </a:r>
-          </a:p>
-          <a:p>
-            <a:pPr marL="228600" indent="-228600">
-              <a:buAutoNum type="arabicPeriod"/>
-            </a:pPr>
-            <a:r>
-              <a:rPr lang="es-ES" sz="1050" dirty="0" smtClean="0">
-                <a:solidFill>
-                  <a:schemeClr val="bg1"/>
-                </a:solidFill>
-                <a:latin typeface="Arial" panose="020B0604020202020204" pitchFamily="34" charset="0"/>
-                <a:cs typeface="Arial" panose="020B0604020202020204" pitchFamily="34" charset="0"/>
-              </a:rPr>
-              <a:t>Escribir la igualdad.</a:t>
-            </a:r>
-          </a:p>
-          <a:p>
-            <a:pPr marL="228600" indent="-228600">
-              <a:buAutoNum type="arabicPeriod"/>
-            </a:pPr>
-            <a:r>
-              <a:rPr lang="es-ES" sz="1050" dirty="0" smtClean="0">
-                <a:solidFill>
-                  <a:schemeClr val="bg1"/>
-                </a:solidFill>
-                <a:latin typeface="Arial" panose="020B0604020202020204" pitchFamily="34" charset="0"/>
-                <a:cs typeface="Arial" panose="020B0604020202020204" pitchFamily="34" charset="0"/>
-              </a:rPr>
-              <a:t>Resolver la ecuación.</a:t>
-            </a:r>
-          </a:p>
-          <a:p>
-            <a:pPr marL="228600" indent="-228600">
-              <a:buAutoNum type="arabicPeriod"/>
-            </a:pPr>
-            <a:r>
-              <a:rPr lang="es-ES" sz="1050" dirty="0" smtClean="0">
-                <a:solidFill>
-                  <a:schemeClr val="bg1"/>
-                </a:solidFill>
-                <a:latin typeface="Arial" panose="020B0604020202020204" pitchFamily="34" charset="0"/>
-                <a:cs typeface="Arial" panose="020B0604020202020204" pitchFamily="34" charset="0"/>
-              </a:rPr>
-              <a:t>Responder la pregunta.</a:t>
-            </a:r>
-          </a:p>
-          <a:p>
-            <a:pPr marL="228600" indent="-228600">
-              <a:buAutoNum type="arabicPeriod"/>
-            </a:pPr>
-            <a:r>
-              <a:rPr lang="es-ES" sz="1050" dirty="0" smtClean="0">
-                <a:solidFill>
-                  <a:schemeClr val="bg1"/>
-                </a:solidFill>
-                <a:latin typeface="Arial" panose="020B0604020202020204" pitchFamily="34" charset="0"/>
-                <a:cs typeface="Arial" panose="020B0604020202020204" pitchFamily="34" charset="0"/>
-              </a:rPr>
-              <a:t>Verificar el valor de verdad de la igualdad.</a:t>
-            </a:r>
+              <a:t>igualdad</a:t>
+            </a:r>
+            <a:endParaRPr lang="es-ES" sz="1050" dirty="0" smtClean="0">
+              <a:solidFill>
+                <a:schemeClr val="bg1"/>
+              </a:solidFill>
+              <a:latin typeface="Arial" panose="020B0604020202020204" pitchFamily="34" charset="0"/>
+              <a:cs typeface="Arial" panose="020B0604020202020204" pitchFamily="34" charset="0"/>
+            </a:endParaRPr>
           </a:p>
         </p:txBody>
       </p:sp>
-      <p:cxnSp>
-        <p:nvCxnSpPr>
-          <p:cNvPr id="227" name="Conector angular 226"/>
-          <p:cNvCxnSpPr>
-            <a:stCxn id="224" idx="2"/>
-            <a:endCxn id="226" idx="0"/>
-          </p:cNvCxnSpPr>
-          <p:nvPr/>
-        </p:nvCxnSpPr>
-        <p:spPr>
-          <a:xfrm rot="5400000">
-            <a:off x="7959519" y="1896492"/>
-            <a:ext cx="132649" cy="2316"/>
-          </a:xfrm>
-          <a:prstGeom prst="bentConnector3">
-            <a:avLst>
-              <a:gd name="adj1" fmla="val 50000"/>
-            </a:avLst>
-          </a:prstGeom>
-          <a:ln/>
-        </p:spPr>
-        <p:style>
-          <a:lnRef idx="3">
-            <a:schemeClr val="dk1"/>
-          </a:lnRef>
-          <a:fillRef idx="0">
-            <a:schemeClr val="dk1"/>
-          </a:fillRef>
-          <a:effectRef idx="2">
-            <a:schemeClr val="dk1"/>
-          </a:effectRef>
-          <a:fontRef idx="minor">
-            <a:schemeClr val="tx1"/>
-          </a:fontRef>
-        </p:style>
-      </p:cxnSp>
       <p:sp>
         <p:nvSpPr>
           <p:cNvPr id="232" name="CuadroTexto 231" descr="Conector entre nodos" title="conector"/>
@@ -3974,6 +3453,542 @@
             <a:avLst>
               <a:gd name="adj1" fmla="val 39196"/>
             </a:avLst>
+          </a:prstGeom>
+        </p:spPr>
+        <p:style>
+          <a:lnRef idx="3">
+            <a:schemeClr val="dk1"/>
+          </a:lnRef>
+          <a:fillRef idx="0">
+            <a:schemeClr val="dk1"/>
+          </a:fillRef>
+          <a:effectRef idx="2">
+            <a:schemeClr val="dk1"/>
+          </a:effectRef>
+          <a:fontRef idx="minor">
+            <a:schemeClr val="tx1"/>
+          </a:fontRef>
+        </p:style>
+      </p:cxnSp>
+      <p:cxnSp>
+        <p:nvCxnSpPr>
+          <p:cNvPr id="62" name="Conector angular 61"/>
+          <p:cNvCxnSpPr/>
+          <p:nvPr/>
+        </p:nvCxnSpPr>
+        <p:spPr>
+          <a:xfrm rot="5400000">
+            <a:off x="1321088" y="2382932"/>
+            <a:ext cx="101767" cy="546"/>
+          </a:xfrm>
+          <a:prstGeom prst="bentConnector3">
+            <a:avLst/>
+          </a:prstGeom>
+        </p:spPr>
+        <p:style>
+          <a:lnRef idx="3">
+            <a:schemeClr val="dk1"/>
+          </a:lnRef>
+          <a:fillRef idx="0">
+            <a:schemeClr val="dk1"/>
+          </a:fillRef>
+          <a:effectRef idx="2">
+            <a:schemeClr val="dk1"/>
+          </a:effectRef>
+          <a:fontRef idx="minor">
+            <a:schemeClr val="tx1"/>
+          </a:fontRef>
+        </p:style>
+      </p:cxnSp>
+      <p:cxnSp>
+        <p:nvCxnSpPr>
+          <p:cNvPr id="63" name="Conector angular 62"/>
+          <p:cNvCxnSpPr/>
+          <p:nvPr/>
+        </p:nvCxnSpPr>
+        <p:spPr>
+          <a:xfrm rot="16200000" flipH="1">
+            <a:off x="1275219" y="2735824"/>
+            <a:ext cx="147962" cy="2"/>
+          </a:xfrm>
+          <a:prstGeom prst="bentConnector3">
+            <a:avLst>
+              <a:gd name="adj1" fmla="val 50000"/>
+            </a:avLst>
+          </a:prstGeom>
+          <a:ln/>
+        </p:spPr>
+        <p:style>
+          <a:lnRef idx="3">
+            <a:schemeClr val="dk1"/>
+          </a:lnRef>
+          <a:fillRef idx="0">
+            <a:schemeClr val="dk1"/>
+          </a:fillRef>
+          <a:effectRef idx="2">
+            <a:schemeClr val="dk1"/>
+          </a:effectRef>
+          <a:fontRef idx="minor">
+            <a:schemeClr val="tx1"/>
+          </a:fontRef>
+        </p:style>
+      </p:cxnSp>
+      <p:cxnSp>
+        <p:nvCxnSpPr>
+          <p:cNvPr id="76" name="Conector angular 75"/>
+          <p:cNvCxnSpPr/>
+          <p:nvPr/>
+        </p:nvCxnSpPr>
+        <p:spPr>
+          <a:xfrm rot="16200000" flipH="1">
+            <a:off x="2908900" y="1702640"/>
+            <a:ext cx="147962" cy="2"/>
+          </a:xfrm>
+          <a:prstGeom prst="bentConnector3">
+            <a:avLst>
+              <a:gd name="adj1" fmla="val 178973"/>
+            </a:avLst>
+          </a:prstGeom>
+          <a:ln/>
+        </p:spPr>
+        <p:style>
+          <a:lnRef idx="3">
+            <a:schemeClr val="dk1"/>
+          </a:lnRef>
+          <a:fillRef idx="0">
+            <a:schemeClr val="dk1"/>
+          </a:fillRef>
+          <a:effectRef idx="2">
+            <a:schemeClr val="dk1"/>
+          </a:effectRef>
+          <a:fontRef idx="minor">
+            <a:schemeClr val="tx1"/>
+          </a:fontRef>
+        </p:style>
+      </p:cxnSp>
+      <p:cxnSp>
+        <p:nvCxnSpPr>
+          <p:cNvPr id="88" name="Conector angular 87"/>
+          <p:cNvCxnSpPr/>
+          <p:nvPr/>
+        </p:nvCxnSpPr>
+        <p:spPr>
+          <a:xfrm rot="5400000">
+            <a:off x="6374356" y="1063305"/>
+            <a:ext cx="250179" cy="2"/>
+          </a:xfrm>
+          <a:prstGeom prst="bentConnector3">
+            <a:avLst/>
+          </a:prstGeom>
+        </p:spPr>
+        <p:style>
+          <a:lnRef idx="3">
+            <a:schemeClr val="dk1"/>
+          </a:lnRef>
+          <a:fillRef idx="0">
+            <a:schemeClr val="dk1"/>
+          </a:fillRef>
+          <a:effectRef idx="2">
+            <a:schemeClr val="dk1"/>
+          </a:effectRef>
+          <a:fontRef idx="minor">
+            <a:schemeClr val="tx1"/>
+          </a:fontRef>
+        </p:style>
+      </p:cxnSp>
+      <p:cxnSp>
+        <p:nvCxnSpPr>
+          <p:cNvPr id="99" name="Conector angular 98"/>
+          <p:cNvCxnSpPr/>
+          <p:nvPr/>
+        </p:nvCxnSpPr>
+        <p:spPr>
+          <a:xfrm rot="16200000" flipV="1">
+            <a:off x="6221232" y="2518825"/>
+            <a:ext cx="535347" cy="1"/>
+          </a:xfrm>
+          <a:prstGeom prst="bentConnector3">
+            <a:avLst/>
+          </a:prstGeom>
+        </p:spPr>
+        <p:style>
+          <a:lnRef idx="3">
+            <a:schemeClr val="dk1"/>
+          </a:lnRef>
+          <a:fillRef idx="0">
+            <a:schemeClr val="dk1"/>
+          </a:fillRef>
+          <a:effectRef idx="2">
+            <a:schemeClr val="dk1"/>
+          </a:effectRef>
+          <a:fontRef idx="minor">
+            <a:schemeClr val="tx1"/>
+          </a:fontRef>
+        </p:style>
+      </p:cxnSp>
+      <p:cxnSp>
+        <p:nvCxnSpPr>
+          <p:cNvPr id="101" name="Conector angular 100"/>
+          <p:cNvCxnSpPr/>
+          <p:nvPr/>
+        </p:nvCxnSpPr>
+        <p:spPr>
+          <a:xfrm rot="5400000">
+            <a:off x="6385348" y="1932381"/>
+            <a:ext cx="250179" cy="2"/>
+          </a:xfrm>
+          <a:prstGeom prst="bentConnector3">
+            <a:avLst/>
+          </a:prstGeom>
+        </p:spPr>
+        <p:style>
+          <a:lnRef idx="3">
+            <a:schemeClr val="dk1"/>
+          </a:lnRef>
+          <a:fillRef idx="0">
+            <a:schemeClr val="dk1"/>
+          </a:fillRef>
+          <a:effectRef idx="2">
+            <a:schemeClr val="dk1"/>
+          </a:effectRef>
+          <a:fontRef idx="minor">
+            <a:schemeClr val="tx1"/>
+          </a:fontRef>
+        </p:style>
+      </p:cxnSp>
+      <p:cxnSp>
+        <p:nvCxnSpPr>
+          <p:cNvPr id="107" name="Conector angular 106"/>
+          <p:cNvCxnSpPr/>
+          <p:nvPr/>
+        </p:nvCxnSpPr>
+        <p:spPr>
+          <a:xfrm rot="5400000">
+            <a:off x="6369630" y="3774723"/>
+            <a:ext cx="250179" cy="2"/>
+          </a:xfrm>
+          <a:prstGeom prst="bentConnector3">
+            <a:avLst/>
+          </a:prstGeom>
+        </p:spPr>
+        <p:style>
+          <a:lnRef idx="3">
+            <a:schemeClr val="dk1"/>
+          </a:lnRef>
+          <a:fillRef idx="0">
+            <a:schemeClr val="dk1"/>
+          </a:fillRef>
+          <a:effectRef idx="2">
+            <a:schemeClr val="dk1"/>
+          </a:effectRef>
+          <a:fontRef idx="minor">
+            <a:schemeClr val="tx1"/>
+          </a:fontRef>
+        </p:style>
+      </p:cxnSp>
+      <p:cxnSp>
+        <p:nvCxnSpPr>
+          <p:cNvPr id="108" name="Conector angular 107"/>
+          <p:cNvCxnSpPr/>
+          <p:nvPr/>
+        </p:nvCxnSpPr>
+        <p:spPr>
+          <a:xfrm rot="5400000">
+            <a:off x="6154866" y="4431211"/>
+            <a:ext cx="689798" cy="642"/>
+          </a:xfrm>
+          <a:prstGeom prst="bentConnector3">
+            <a:avLst/>
+          </a:prstGeom>
+        </p:spPr>
+        <p:style>
+          <a:lnRef idx="3">
+            <a:schemeClr val="dk1"/>
+          </a:lnRef>
+          <a:fillRef idx="0">
+            <a:schemeClr val="dk1"/>
+          </a:fillRef>
+          <a:effectRef idx="2">
+            <a:schemeClr val="dk1"/>
+          </a:effectRef>
+          <a:fontRef idx="minor">
+            <a:schemeClr val="tx1"/>
+          </a:fontRef>
+        </p:style>
+      </p:cxnSp>
+      <p:sp>
+        <p:nvSpPr>
+          <p:cNvPr id="109" name="Rectángulo 108" descr="Nodo de tercer nivel" title="Nodo03"/>
+          <p:cNvSpPr/>
+          <p:nvPr/>
+        </p:nvSpPr>
+        <p:spPr>
+          <a:xfrm>
+            <a:off x="5081967" y="4964535"/>
+            <a:ext cx="1063950" cy="756959"/>
+          </a:xfrm>
+          <a:prstGeom prst="rect">
+            <a:avLst/>
+          </a:prstGeom>
+          <a:solidFill>
+            <a:schemeClr val="bg2">
+              <a:lumMod val="90000"/>
+            </a:schemeClr>
+          </a:solidFill>
+          <a:ln>
+            <a:solidFill>
+              <a:schemeClr val="tx1"/>
+            </a:solidFill>
+          </a:ln>
+        </p:spPr>
+        <p:style>
+          <a:lnRef idx="2">
+            <a:schemeClr val="accent6"/>
+          </a:lnRef>
+          <a:fillRef idx="1">
+            <a:schemeClr val="lt1"/>
+          </a:fillRef>
+          <a:effectRef idx="0">
+            <a:schemeClr val="accent6"/>
+          </a:effectRef>
+          <a:fontRef idx="minor">
+            <a:schemeClr val="dk1"/>
+          </a:fontRef>
+        </p:style>
+        <p:txBody>
+          <a:bodyPr rtlCol="0" anchor="ctr"/>
+          <a:lstStyle/>
+          <a:p>
+            <a:endParaRPr lang="es-ES" sz="900" dirty="0" smtClean="0">
+              <a:solidFill>
+                <a:schemeClr val="tx1"/>
+              </a:solidFill>
+              <a:latin typeface="Arial" panose="020B0604020202020204" pitchFamily="34" charset="0"/>
+              <a:cs typeface="Arial" panose="020B0604020202020204" pitchFamily="34" charset="0"/>
+            </a:endParaRPr>
+          </a:p>
+          <a:p>
+            <a:r>
+              <a:rPr lang="es-ES" sz="900" dirty="0" smtClean="0">
+                <a:solidFill>
+                  <a:schemeClr val="tx1"/>
+                </a:solidFill>
+                <a:latin typeface="Arial" panose="020B0604020202020204" pitchFamily="34" charset="0"/>
+                <a:cs typeface="Arial" panose="020B0604020202020204" pitchFamily="34" charset="0"/>
+              </a:rPr>
+              <a:t>se reduce cada miembro a una sola cantidad realizando las operaciones</a:t>
+            </a:r>
+            <a:endParaRPr lang="es-ES" sz="900" dirty="0">
+              <a:solidFill>
+                <a:schemeClr val="tx1"/>
+              </a:solidFill>
+              <a:latin typeface="Arial" panose="020B0604020202020204" pitchFamily="34" charset="0"/>
+              <a:cs typeface="Arial" panose="020B0604020202020204" pitchFamily="34" charset="0"/>
+            </a:endParaRPr>
+          </a:p>
+          <a:p>
+            <a:endParaRPr lang="es-ES" sz="900" dirty="0">
+              <a:solidFill>
+                <a:schemeClr val="tx1"/>
+              </a:solidFill>
+              <a:latin typeface="Arial" panose="020B0604020202020204" pitchFamily="34" charset="0"/>
+              <a:cs typeface="Arial" panose="020B0604020202020204" pitchFamily="34" charset="0"/>
+            </a:endParaRPr>
+          </a:p>
+        </p:txBody>
+      </p:sp>
+      <p:sp>
+        <p:nvSpPr>
+          <p:cNvPr id="110" name="Rectángulo 109" descr="Nodo de tercer nivel" title="Nodo03"/>
+          <p:cNvSpPr/>
+          <p:nvPr/>
+        </p:nvSpPr>
+        <p:spPr>
+          <a:xfrm>
+            <a:off x="6344662" y="4955182"/>
+            <a:ext cx="1101521" cy="983733"/>
+          </a:xfrm>
+          <a:prstGeom prst="rect">
+            <a:avLst/>
+          </a:prstGeom>
+          <a:solidFill>
+            <a:schemeClr val="bg2">
+              <a:lumMod val="90000"/>
+            </a:schemeClr>
+          </a:solidFill>
+          <a:ln>
+            <a:solidFill>
+              <a:schemeClr val="tx1"/>
+            </a:solidFill>
+          </a:ln>
+        </p:spPr>
+        <p:style>
+          <a:lnRef idx="2">
+            <a:schemeClr val="accent6"/>
+          </a:lnRef>
+          <a:fillRef idx="1">
+            <a:schemeClr val="lt1"/>
+          </a:fillRef>
+          <a:effectRef idx="0">
+            <a:schemeClr val="accent6"/>
+          </a:effectRef>
+          <a:fontRef idx="minor">
+            <a:schemeClr val="dk1"/>
+          </a:fontRef>
+        </p:style>
+        <p:txBody>
+          <a:bodyPr rtlCol="0" anchor="ctr"/>
+          <a:lstStyle/>
+          <a:p>
+            <a:endParaRPr lang="es-ES" sz="900" dirty="0" smtClean="0">
+              <a:solidFill>
+                <a:schemeClr val="tx1"/>
+              </a:solidFill>
+              <a:latin typeface="Arial" panose="020B0604020202020204" pitchFamily="34" charset="0"/>
+              <a:cs typeface="Arial" panose="020B0604020202020204" pitchFamily="34" charset="0"/>
+            </a:endParaRPr>
+          </a:p>
+          <a:p>
+            <a:r>
+              <a:rPr lang="es-ES" sz="900" dirty="0" smtClean="0">
+                <a:solidFill>
+                  <a:schemeClr val="tx1"/>
+                </a:solidFill>
+                <a:latin typeface="Arial" panose="020B0604020202020204" pitchFamily="34" charset="0"/>
+                <a:cs typeface="Arial" panose="020B0604020202020204" pitchFamily="34" charset="0"/>
+              </a:rPr>
+              <a:t>se despeja la incógnita, se halla el valor y se verifica remplazando el valor en la ecuación</a:t>
+            </a:r>
+            <a:endParaRPr lang="es-ES" sz="900" dirty="0">
+              <a:solidFill>
+                <a:schemeClr val="tx1"/>
+              </a:solidFill>
+              <a:latin typeface="Arial" panose="020B0604020202020204" pitchFamily="34" charset="0"/>
+              <a:cs typeface="Arial" panose="020B0604020202020204" pitchFamily="34" charset="0"/>
+            </a:endParaRPr>
+          </a:p>
+          <a:p>
+            <a:endParaRPr lang="es-ES" sz="900" dirty="0">
+              <a:solidFill>
+                <a:schemeClr val="tx1"/>
+              </a:solidFill>
+              <a:latin typeface="Arial" panose="020B0604020202020204" pitchFamily="34" charset="0"/>
+              <a:cs typeface="Arial" panose="020B0604020202020204" pitchFamily="34" charset="0"/>
+            </a:endParaRPr>
+          </a:p>
+        </p:txBody>
+      </p:sp>
+      <p:cxnSp>
+        <p:nvCxnSpPr>
+          <p:cNvPr id="111" name="Conector angular 110"/>
+          <p:cNvCxnSpPr/>
+          <p:nvPr/>
+        </p:nvCxnSpPr>
+        <p:spPr>
+          <a:xfrm flipV="1">
+            <a:off x="4027387" y="4784324"/>
+            <a:ext cx="2328854" cy="158420"/>
+          </a:xfrm>
+          <a:prstGeom prst="bentConnector3">
+            <a:avLst>
+              <a:gd name="adj1" fmla="val 152"/>
+            </a:avLst>
+          </a:prstGeom>
+        </p:spPr>
+        <p:style>
+          <a:lnRef idx="3">
+            <a:schemeClr val="dk1"/>
+          </a:lnRef>
+          <a:fillRef idx="0">
+            <a:schemeClr val="dk1"/>
+          </a:fillRef>
+          <a:effectRef idx="2">
+            <a:schemeClr val="dk1"/>
+          </a:effectRef>
+          <a:fontRef idx="minor">
+            <a:schemeClr val="tx1"/>
+          </a:fontRef>
+        </p:style>
+      </p:cxnSp>
+      <p:cxnSp>
+        <p:nvCxnSpPr>
+          <p:cNvPr id="120" name="Conector angular 119"/>
+          <p:cNvCxnSpPr/>
+          <p:nvPr/>
+        </p:nvCxnSpPr>
+        <p:spPr>
+          <a:xfrm rot="10800000">
+            <a:off x="6335753" y="4781866"/>
+            <a:ext cx="850429" cy="163508"/>
+          </a:xfrm>
+          <a:prstGeom prst="bentConnector3">
+            <a:avLst>
+              <a:gd name="adj1" fmla="val 1381"/>
+            </a:avLst>
+          </a:prstGeom>
+        </p:spPr>
+        <p:style>
+          <a:lnRef idx="3">
+            <a:schemeClr val="dk1"/>
+          </a:lnRef>
+          <a:fillRef idx="0">
+            <a:schemeClr val="dk1"/>
+          </a:fillRef>
+          <a:effectRef idx="2">
+            <a:schemeClr val="dk1"/>
+          </a:effectRef>
+          <a:fontRef idx="minor">
+            <a:schemeClr val="tx1"/>
+          </a:fontRef>
+        </p:style>
+      </p:cxnSp>
+      <p:cxnSp>
+        <p:nvCxnSpPr>
+          <p:cNvPr id="124" name="Conector angular 123"/>
+          <p:cNvCxnSpPr>
+            <a:endCxn id="109" idx="0"/>
+          </p:cNvCxnSpPr>
+          <p:nvPr/>
+        </p:nvCxnSpPr>
+        <p:spPr>
+          <a:xfrm rot="16200000" flipH="1">
+            <a:off x="5501576" y="4852169"/>
+            <a:ext cx="179424" cy="45307"/>
+          </a:xfrm>
+          <a:prstGeom prst="bentConnector3">
+            <a:avLst>
+              <a:gd name="adj1" fmla="val 98748"/>
+            </a:avLst>
+          </a:prstGeom>
+        </p:spPr>
+        <p:style>
+          <a:lnRef idx="3">
+            <a:schemeClr val="dk1"/>
+          </a:lnRef>
+          <a:fillRef idx="0">
+            <a:schemeClr val="dk1"/>
+          </a:fillRef>
+          <a:effectRef idx="2">
+            <a:schemeClr val="dk1"/>
+          </a:effectRef>
+          <a:fontRef idx="minor">
+            <a:schemeClr val="tx1"/>
+          </a:fontRef>
+        </p:style>
+      </p:cxnSp>
+      <p:cxnSp>
+        <p:nvCxnSpPr>
+          <p:cNvPr id="131" name="Conector angular 130"/>
+          <p:cNvCxnSpPr/>
+          <p:nvPr/>
+        </p:nvCxnSpPr>
+        <p:spPr>
+          <a:xfrm rot="16200000" flipV="1">
+            <a:off x="7757011" y="2511317"/>
+            <a:ext cx="535347" cy="1"/>
+          </a:xfrm>
+          <a:prstGeom prst="bentConnector3">
+            <a:avLst/>
           </a:prstGeom>
         </p:spPr>
         <p:style>

</xml_diff>